<commit_message>
Add day 2 and 3 (incomplete)
</commit_message>
<xml_diff>
--- a/Day2/Day_2.pptx
+++ b/Day2/Day_2.pptx
@@ -1222,7 +1222,7 @@
           <a:noFill/>
           <a:extLst>
             <a:ext uri="{909E8E84-426E-40dd-AFC4-6F175D3DCCD1}">
-              <a14:hiddenFill xmlns="" xmlns:a14="http://schemas.microsoft.com/office/drawing/2010/main">
+              <a14:hiddenFill xmlns:a14="http://schemas.microsoft.com/office/drawing/2010/main" xmlns="">
                 <a:solidFill>
                   <a:srgbClr val="FFFFFF"/>
                 </a:solidFill>
@@ -1282,7 +1282,7 @@
             </a:ln>
             <a:extLst>
               <a:ext uri="{91240B29-F687-4f45-9708-019B960494DF}">
-                <a14:hiddenLine xmlns="" xmlns:a14="http://schemas.microsoft.com/office/drawing/2010/main" w="9525">
+                <a14:hiddenLine xmlns:a14="http://schemas.microsoft.com/office/drawing/2010/main" xmlns="" w="9525">
                   <a:solidFill>
                     <a:srgbClr val="000000"/>
                   </a:solidFill>
@@ -1372,7 +1372,7 @@
             </a:ln>
             <a:extLst>
               <a:ext uri="{91240B29-F687-4f45-9708-019B960494DF}">
-                <a14:hiddenLine xmlns="" xmlns:a14="http://schemas.microsoft.com/office/drawing/2010/main" w="9525">
+                <a14:hiddenLine xmlns:a14="http://schemas.microsoft.com/office/drawing/2010/main" xmlns="" w="9525">
                   <a:solidFill>
                     <a:srgbClr val="000000"/>
                   </a:solidFill>
@@ -1462,7 +1462,7 @@
             </a:ln>
             <a:extLst>
               <a:ext uri="{91240B29-F687-4f45-9708-019B960494DF}">
-                <a14:hiddenLine xmlns="" xmlns:a14="http://schemas.microsoft.com/office/drawing/2010/main" w="9525">
+                <a14:hiddenLine xmlns:a14="http://schemas.microsoft.com/office/drawing/2010/main" xmlns="" w="9525">
                   <a:solidFill>
                     <a:srgbClr val="000000"/>
                   </a:solidFill>
@@ -1496,7 +1496,7 @@
             </a:ln>
             <a:extLst>
               <a:ext uri="{91240B29-F687-4f45-9708-019B960494DF}">
-                <a14:hiddenLine xmlns="" xmlns:a14="http://schemas.microsoft.com/office/drawing/2010/main" w="9525">
+                <a14:hiddenLine xmlns:a14="http://schemas.microsoft.com/office/drawing/2010/main" xmlns="" w="9525">
                   <a:solidFill>
                     <a:srgbClr val="000000"/>
                   </a:solidFill>
@@ -1586,7 +1586,7 @@
             </a:ln>
             <a:extLst>
               <a:ext uri="{91240B29-F687-4f45-9708-019B960494DF}">
-                <a14:hiddenLine xmlns="" xmlns:a14="http://schemas.microsoft.com/office/drawing/2010/main" w="9525">
+                <a14:hiddenLine xmlns:a14="http://schemas.microsoft.com/office/drawing/2010/main" xmlns="" w="9525">
                   <a:solidFill>
                     <a:srgbClr val="000000"/>
                   </a:solidFill>
@@ -1648,7 +1648,7 @@
             </a:ln>
             <a:extLst>
               <a:ext uri="{91240B29-F687-4f45-9708-019B960494DF}">
-                <a14:hiddenLine xmlns="" xmlns:a14="http://schemas.microsoft.com/office/drawing/2010/main" w="9525">
+                <a14:hiddenLine xmlns:a14="http://schemas.microsoft.com/office/drawing/2010/main" xmlns="" w="9525">
                   <a:solidFill>
                     <a:srgbClr val="000000"/>
                   </a:solidFill>
@@ -1710,7 +1710,7 @@
             </a:ln>
             <a:extLst>
               <a:ext uri="{91240B29-F687-4f45-9708-019B960494DF}">
-                <a14:hiddenLine xmlns="" xmlns:a14="http://schemas.microsoft.com/office/drawing/2010/main" w="9525">
+                <a14:hiddenLine xmlns:a14="http://schemas.microsoft.com/office/drawing/2010/main" xmlns="" w="9525">
                   <a:solidFill>
                     <a:srgbClr val="000000"/>
                   </a:solidFill>
@@ -1800,7 +1800,7 @@
             </a:ln>
             <a:extLst>
               <a:ext uri="{91240B29-F687-4f45-9708-019B960494DF}">
-                <a14:hiddenLine xmlns="" xmlns:a14="http://schemas.microsoft.com/office/drawing/2010/main" w="9525">
+                <a14:hiddenLine xmlns:a14="http://schemas.microsoft.com/office/drawing/2010/main" xmlns="" w="9525">
                   <a:solidFill>
                     <a:srgbClr val="000000"/>
                   </a:solidFill>
@@ -1862,7 +1862,7 @@
             </a:ln>
             <a:extLst>
               <a:ext uri="{91240B29-F687-4f45-9708-019B960494DF}">
-                <a14:hiddenLine xmlns="" xmlns:a14="http://schemas.microsoft.com/office/drawing/2010/main" w="9525">
+                <a14:hiddenLine xmlns:a14="http://schemas.microsoft.com/office/drawing/2010/main" xmlns="" w="9525">
                   <a:solidFill>
                     <a:srgbClr val="000000"/>
                   </a:solidFill>
@@ -1924,7 +1924,7 @@
             </a:ln>
             <a:extLst>
               <a:ext uri="{91240B29-F687-4f45-9708-019B960494DF}">
-                <a14:hiddenLine xmlns="" xmlns:a14="http://schemas.microsoft.com/office/drawing/2010/main" w="9525">
+                <a14:hiddenLine xmlns:a14="http://schemas.microsoft.com/office/drawing/2010/main" xmlns="" w="9525">
                   <a:solidFill>
                     <a:srgbClr val="000000"/>
                   </a:solidFill>
@@ -2014,7 +2014,7 @@
             </a:ln>
             <a:extLst>
               <a:ext uri="{91240B29-F687-4f45-9708-019B960494DF}">
-                <a14:hiddenLine xmlns="" xmlns:a14="http://schemas.microsoft.com/office/drawing/2010/main" w="9525">
+                <a14:hiddenLine xmlns:a14="http://schemas.microsoft.com/office/drawing/2010/main" xmlns="" w="9525">
                   <a:solidFill>
                     <a:srgbClr val="000000"/>
                   </a:solidFill>
@@ -2104,7 +2104,7 @@
             </a:ln>
             <a:extLst>
               <a:ext uri="{91240B29-F687-4f45-9708-019B960494DF}">
-                <a14:hiddenLine xmlns="" xmlns:a14="http://schemas.microsoft.com/office/drawing/2010/main" w="9525">
+                <a14:hiddenLine xmlns:a14="http://schemas.microsoft.com/office/drawing/2010/main" xmlns="" w="9525">
                   <a:solidFill>
                     <a:srgbClr val="000000"/>
                   </a:solidFill>
@@ -2166,7 +2166,7 @@
             </a:ln>
             <a:extLst>
               <a:ext uri="{91240B29-F687-4f45-9708-019B960494DF}">
-                <a14:hiddenLine xmlns="" xmlns:a14="http://schemas.microsoft.com/office/drawing/2010/main" w="9525">
+                <a14:hiddenLine xmlns:a14="http://schemas.microsoft.com/office/drawing/2010/main" xmlns="" w="9525">
                   <a:solidFill>
                     <a:srgbClr val="000000"/>
                   </a:solidFill>
@@ -2276,7 +2276,7 @@
             </a:ln>
             <a:extLst>
               <a:ext uri="{91240B29-F687-4f45-9708-019B960494DF}">
-                <a14:hiddenLine xmlns="" xmlns:a14="http://schemas.microsoft.com/office/drawing/2010/main" w="9525">
+                <a14:hiddenLine xmlns:a14="http://schemas.microsoft.com/office/drawing/2010/main" xmlns="" w="9525">
                   <a:solidFill>
                     <a:srgbClr val="000000"/>
                   </a:solidFill>
@@ -2338,7 +2338,7 @@
             </a:ln>
             <a:extLst>
               <a:ext uri="{91240B29-F687-4f45-9708-019B960494DF}">
-                <a14:hiddenLine xmlns="" xmlns:a14="http://schemas.microsoft.com/office/drawing/2010/main" w="9525">
+                <a14:hiddenLine xmlns:a14="http://schemas.microsoft.com/office/drawing/2010/main" xmlns="" w="9525">
                   <a:solidFill>
                     <a:srgbClr val="000000"/>
                   </a:solidFill>
@@ -2428,7 +2428,7 @@
             </a:ln>
             <a:extLst>
               <a:ext uri="{91240B29-F687-4f45-9708-019B960494DF}">
-                <a14:hiddenLine xmlns="" xmlns:a14="http://schemas.microsoft.com/office/drawing/2010/main" w="9525">
+                <a14:hiddenLine xmlns:a14="http://schemas.microsoft.com/office/drawing/2010/main" xmlns="" w="9525">
                   <a:solidFill>
                     <a:srgbClr val="000000"/>
                   </a:solidFill>
@@ -2518,7 +2518,7 @@
             </a:ln>
             <a:extLst>
               <a:ext uri="{91240B29-F687-4f45-9708-019B960494DF}">
-                <a14:hiddenLine xmlns="" xmlns:a14="http://schemas.microsoft.com/office/drawing/2010/main" w="9525">
+                <a14:hiddenLine xmlns:a14="http://schemas.microsoft.com/office/drawing/2010/main" xmlns="" w="9525">
                   <a:solidFill>
                     <a:srgbClr val="000000"/>
                   </a:solidFill>
@@ -2580,7 +2580,7 @@
             </a:ln>
             <a:extLst>
               <a:ext uri="{91240B29-F687-4f45-9708-019B960494DF}">
-                <a14:hiddenLine xmlns="" xmlns:a14="http://schemas.microsoft.com/office/drawing/2010/main" w="9525">
+                <a14:hiddenLine xmlns:a14="http://schemas.microsoft.com/office/drawing/2010/main" xmlns="" w="9525">
                   <a:solidFill>
                     <a:srgbClr val="000000"/>
                   </a:solidFill>
@@ -2670,7 +2670,7 @@
             </a:ln>
             <a:extLst>
               <a:ext uri="{91240B29-F687-4f45-9708-019B960494DF}">
-                <a14:hiddenLine xmlns="" xmlns:a14="http://schemas.microsoft.com/office/drawing/2010/main" w="9525">
+                <a14:hiddenLine xmlns:a14="http://schemas.microsoft.com/office/drawing/2010/main" xmlns="" w="9525">
                   <a:solidFill>
                     <a:srgbClr val="000000"/>
                   </a:solidFill>
@@ -2760,7 +2760,7 @@
             </a:ln>
             <a:extLst>
               <a:ext uri="{91240B29-F687-4f45-9708-019B960494DF}">
-                <a14:hiddenLine xmlns="" xmlns:a14="http://schemas.microsoft.com/office/drawing/2010/main" w="9525">
+                <a14:hiddenLine xmlns:a14="http://schemas.microsoft.com/office/drawing/2010/main" xmlns="" w="9525">
                   <a:solidFill>
                     <a:srgbClr val="000000"/>
                   </a:solidFill>
@@ -2816,7 +2816,7 @@
             </a:ln>
             <a:extLst>
               <a:ext uri="{91240B29-F687-4f45-9708-019B960494DF}">
-                <a14:hiddenLine xmlns="" xmlns:a14="http://schemas.microsoft.com/office/drawing/2010/main" w="9525">
+                <a14:hiddenLine xmlns:a14="http://schemas.microsoft.com/office/drawing/2010/main" xmlns="" w="9525">
                   <a:solidFill>
                     <a:srgbClr val="000000"/>
                   </a:solidFill>
@@ -2906,7 +2906,7 @@
             </a:ln>
             <a:extLst>
               <a:ext uri="{91240B29-F687-4f45-9708-019B960494DF}">
-                <a14:hiddenLine xmlns="" xmlns:a14="http://schemas.microsoft.com/office/drawing/2010/main" w="9525">
+                <a14:hiddenLine xmlns:a14="http://schemas.microsoft.com/office/drawing/2010/main" xmlns="" w="9525">
                   <a:solidFill>
                     <a:srgbClr val="000000"/>
                   </a:solidFill>
@@ -2962,7 +2962,7 @@
             </a:ln>
             <a:extLst>
               <a:ext uri="{91240B29-F687-4f45-9708-019B960494DF}">
-                <a14:hiddenLine xmlns="" xmlns:a14="http://schemas.microsoft.com/office/drawing/2010/main" w="9525">
+                <a14:hiddenLine xmlns:a14="http://schemas.microsoft.com/office/drawing/2010/main" xmlns="" w="9525">
                   <a:solidFill>
                     <a:srgbClr val="000000"/>
                   </a:solidFill>
@@ -3052,7 +3052,7 @@
             </a:ln>
             <a:extLst>
               <a:ext uri="{91240B29-F687-4f45-9708-019B960494DF}">
-                <a14:hiddenLine xmlns="" xmlns:a14="http://schemas.microsoft.com/office/drawing/2010/main" w="9525">
+                <a14:hiddenLine xmlns:a14="http://schemas.microsoft.com/office/drawing/2010/main" xmlns="" w="9525">
                   <a:solidFill>
                     <a:srgbClr val="000000"/>
                   </a:solidFill>
@@ -3120,7 +3120,7 @@
             </a:ln>
             <a:extLst>
               <a:ext uri="{91240B29-F687-4f45-9708-019B960494DF}">
-                <a14:hiddenLine xmlns="" xmlns:a14="http://schemas.microsoft.com/office/drawing/2010/main" w="9525">
+                <a14:hiddenLine xmlns:a14="http://schemas.microsoft.com/office/drawing/2010/main" xmlns="" w="9525">
                   <a:solidFill>
                     <a:srgbClr val="000000"/>
                   </a:solidFill>
@@ -3210,7 +3210,7 @@
             </a:ln>
             <a:extLst>
               <a:ext uri="{91240B29-F687-4f45-9708-019B960494DF}">
-                <a14:hiddenLine xmlns="" xmlns:a14="http://schemas.microsoft.com/office/drawing/2010/main" w="9525">
+                <a14:hiddenLine xmlns:a14="http://schemas.microsoft.com/office/drawing/2010/main" xmlns="" w="9525">
                   <a:solidFill>
                     <a:srgbClr val="000000"/>
                   </a:solidFill>
@@ -3278,7 +3278,7 @@
             </a:ln>
             <a:extLst>
               <a:ext uri="{91240B29-F687-4f45-9708-019B960494DF}">
-                <a14:hiddenLine xmlns="" xmlns:a14="http://schemas.microsoft.com/office/drawing/2010/main" w="9525">
+                <a14:hiddenLine xmlns:a14="http://schemas.microsoft.com/office/drawing/2010/main" xmlns="" w="9525">
                   <a:solidFill>
                     <a:srgbClr val="000000"/>
                   </a:solidFill>
@@ -3368,7 +3368,7 @@
             </a:ln>
             <a:extLst>
               <a:ext uri="{91240B29-F687-4f45-9708-019B960494DF}">
-                <a14:hiddenLine xmlns="" xmlns:a14="http://schemas.microsoft.com/office/drawing/2010/main" w="9525">
+                <a14:hiddenLine xmlns:a14="http://schemas.microsoft.com/office/drawing/2010/main" xmlns="" w="9525">
                   <a:solidFill>
                     <a:srgbClr val="000000"/>
                   </a:solidFill>
@@ -3402,7 +3402,7 @@
             </a:ln>
             <a:extLst>
               <a:ext uri="{91240B29-F687-4f45-9708-019B960494DF}">
-                <a14:hiddenLine xmlns="" xmlns:a14="http://schemas.microsoft.com/office/drawing/2010/main" w="9525">
+                <a14:hiddenLine xmlns:a14="http://schemas.microsoft.com/office/drawing/2010/main" xmlns="" w="9525">
                   <a:solidFill>
                     <a:srgbClr val="000000"/>
                   </a:solidFill>
@@ -3492,7 +3492,7 @@
             </a:ln>
             <a:extLst>
               <a:ext uri="{91240B29-F687-4f45-9708-019B960494DF}">
-                <a14:hiddenLine xmlns="" xmlns:a14="http://schemas.microsoft.com/office/drawing/2010/main" w="9525">
+                <a14:hiddenLine xmlns:a14="http://schemas.microsoft.com/office/drawing/2010/main" xmlns="" w="9525">
                   <a:solidFill>
                     <a:srgbClr val="000000"/>
                   </a:solidFill>
@@ -3554,7 +3554,7 @@
             </a:ln>
             <a:extLst>
               <a:ext uri="{91240B29-F687-4f45-9708-019B960494DF}">
-                <a14:hiddenLine xmlns="" xmlns:a14="http://schemas.microsoft.com/office/drawing/2010/main" w="9525">
+                <a14:hiddenLine xmlns:a14="http://schemas.microsoft.com/office/drawing/2010/main" xmlns="" w="9525">
                   <a:solidFill>
                     <a:srgbClr val="000000"/>
                   </a:solidFill>
@@ -3616,7 +3616,7 @@
             </a:ln>
             <a:extLst>
               <a:ext uri="{91240B29-F687-4f45-9708-019B960494DF}">
-                <a14:hiddenLine xmlns="" xmlns:a14="http://schemas.microsoft.com/office/drawing/2010/main" w="9525">
+                <a14:hiddenLine xmlns:a14="http://schemas.microsoft.com/office/drawing/2010/main" xmlns="" w="9525">
                   <a:solidFill>
                     <a:srgbClr val="000000"/>
                   </a:solidFill>
@@ -3706,7 +3706,7 @@
             </a:ln>
             <a:extLst>
               <a:ext uri="{91240B29-F687-4f45-9708-019B960494DF}">
-                <a14:hiddenLine xmlns="" xmlns:a14="http://schemas.microsoft.com/office/drawing/2010/main" w="9525">
+                <a14:hiddenLine xmlns:a14="http://schemas.microsoft.com/office/drawing/2010/main" xmlns="" w="9525">
                   <a:solidFill>
                     <a:srgbClr val="000000"/>
                   </a:solidFill>
@@ -3774,7 +3774,7 @@
             </a:ln>
             <a:extLst>
               <a:ext uri="{91240B29-F687-4f45-9708-019B960494DF}">
-                <a14:hiddenLine xmlns="" xmlns:a14="http://schemas.microsoft.com/office/drawing/2010/main" w="9525">
+                <a14:hiddenLine xmlns:a14="http://schemas.microsoft.com/office/drawing/2010/main" xmlns="" w="9525">
                   <a:solidFill>
                     <a:srgbClr val="000000"/>
                   </a:solidFill>
@@ -3836,7 +3836,7 @@
             </a:ln>
             <a:extLst>
               <a:ext uri="{91240B29-F687-4f45-9708-019B960494DF}">
-                <a14:hiddenLine xmlns="" xmlns:a14="http://schemas.microsoft.com/office/drawing/2010/main" w="9525">
+                <a14:hiddenLine xmlns:a14="http://schemas.microsoft.com/office/drawing/2010/main" xmlns="" w="9525">
                   <a:solidFill>
                     <a:srgbClr val="000000"/>
                   </a:solidFill>
@@ -3926,7 +3926,7 @@
             </a:ln>
             <a:extLst>
               <a:ext uri="{91240B29-F687-4f45-9708-019B960494DF}">
-                <a14:hiddenLine xmlns="" xmlns:a14="http://schemas.microsoft.com/office/drawing/2010/main" w="9525">
+                <a14:hiddenLine xmlns:a14="http://schemas.microsoft.com/office/drawing/2010/main" xmlns="" w="9525">
                   <a:solidFill>
                     <a:srgbClr val="000000"/>
                   </a:solidFill>
@@ -3988,7 +3988,7 @@
             </a:ln>
             <a:extLst>
               <a:ext uri="{91240B29-F687-4f45-9708-019B960494DF}">
-                <a14:hiddenLine xmlns="" xmlns:a14="http://schemas.microsoft.com/office/drawing/2010/main" w="9525">
+                <a14:hiddenLine xmlns:a14="http://schemas.microsoft.com/office/drawing/2010/main" xmlns="" w="9525">
                   <a:solidFill>
                     <a:srgbClr val="000000"/>
                   </a:solidFill>
@@ -4078,7 +4078,7 @@
             </a:ln>
             <a:extLst>
               <a:ext uri="{91240B29-F687-4f45-9708-019B960494DF}">
-                <a14:hiddenLine xmlns="" xmlns:a14="http://schemas.microsoft.com/office/drawing/2010/main" w="9525">
+                <a14:hiddenLine xmlns:a14="http://schemas.microsoft.com/office/drawing/2010/main" xmlns="" w="9525">
                   <a:solidFill>
                     <a:srgbClr val="000000"/>
                   </a:solidFill>
@@ -4140,7 +4140,7 @@
             </a:ln>
             <a:extLst>
               <a:ext uri="{91240B29-F687-4f45-9708-019B960494DF}">
-                <a14:hiddenLine xmlns="" xmlns:a14="http://schemas.microsoft.com/office/drawing/2010/main" w="9525">
+                <a14:hiddenLine xmlns:a14="http://schemas.microsoft.com/office/drawing/2010/main" xmlns="" w="9525">
                   <a:solidFill>
                     <a:srgbClr val="000000"/>
                   </a:solidFill>
@@ -4230,7 +4230,7 @@
             </a:ln>
             <a:extLst>
               <a:ext uri="{91240B29-F687-4f45-9708-019B960494DF}">
-                <a14:hiddenLine xmlns="" xmlns:a14="http://schemas.microsoft.com/office/drawing/2010/main" w="9525">
+                <a14:hiddenLine xmlns:a14="http://schemas.microsoft.com/office/drawing/2010/main" xmlns="" w="9525">
                   <a:solidFill>
                     <a:srgbClr val="000000"/>
                   </a:solidFill>
@@ -4264,7 +4264,7 @@
             </a:ln>
             <a:extLst>
               <a:ext uri="{91240B29-F687-4f45-9708-019B960494DF}">
-                <a14:hiddenLine xmlns="" xmlns:a14="http://schemas.microsoft.com/office/drawing/2010/main" w="9525">
+                <a14:hiddenLine xmlns:a14="http://schemas.microsoft.com/office/drawing/2010/main" xmlns="" w="9525">
                   <a:solidFill>
                     <a:srgbClr val="000000"/>
                   </a:solidFill>
@@ -4329,7 +4329,7 @@
             </a:ln>
             <a:extLst>
               <a:ext uri="{91240B29-F687-4f45-9708-019B960494DF}">
-                <a14:hiddenLine xmlns="" xmlns:a14="http://schemas.microsoft.com/office/drawing/2010/main" w="9525">
+                <a14:hiddenLine xmlns:a14="http://schemas.microsoft.com/office/drawing/2010/main" xmlns="" w="9525">
                   <a:solidFill>
                     <a:srgbClr val="000000"/>
                   </a:solidFill>
@@ -4419,7 +4419,7 @@
             </a:ln>
             <a:extLst>
               <a:ext uri="{91240B29-F687-4f45-9708-019B960494DF}">
-                <a14:hiddenLine xmlns="" xmlns:a14="http://schemas.microsoft.com/office/drawing/2010/main" w="9525">
+                <a14:hiddenLine xmlns:a14="http://schemas.microsoft.com/office/drawing/2010/main" xmlns="" w="9525">
                   <a:solidFill>
                     <a:srgbClr val="000000"/>
                   </a:solidFill>
@@ -4481,7 +4481,7 @@
             </a:ln>
             <a:extLst>
               <a:ext uri="{91240B29-F687-4f45-9708-019B960494DF}">
-                <a14:hiddenLine xmlns="" xmlns:a14="http://schemas.microsoft.com/office/drawing/2010/main" w="9525">
+                <a14:hiddenLine xmlns:a14="http://schemas.microsoft.com/office/drawing/2010/main" xmlns="" w="9525">
                   <a:solidFill>
                     <a:srgbClr val="000000"/>
                   </a:solidFill>
@@ -4571,7 +4571,7 @@
             </a:ln>
             <a:extLst>
               <a:ext uri="{91240B29-F687-4f45-9708-019B960494DF}">
-                <a14:hiddenLine xmlns="" xmlns:a14="http://schemas.microsoft.com/office/drawing/2010/main" w="9525">
+                <a14:hiddenLine xmlns:a14="http://schemas.microsoft.com/office/drawing/2010/main" xmlns="" w="9525">
                   <a:solidFill>
                     <a:srgbClr val="000000"/>
                   </a:solidFill>
@@ -4661,7 +4661,7 @@
             </a:ln>
             <a:extLst>
               <a:ext uri="{91240B29-F687-4f45-9708-019B960494DF}">
-                <a14:hiddenLine xmlns="" xmlns:a14="http://schemas.microsoft.com/office/drawing/2010/main" w="9525">
+                <a14:hiddenLine xmlns:a14="http://schemas.microsoft.com/office/drawing/2010/main" xmlns="" w="9525">
                   <a:solidFill>
                     <a:srgbClr val="000000"/>
                   </a:solidFill>
@@ -4726,7 +4726,7 @@
             </a:ln>
             <a:extLst>
               <a:ext uri="{91240B29-F687-4f45-9708-019B960494DF}">
-                <a14:hiddenLine xmlns="" xmlns:a14="http://schemas.microsoft.com/office/drawing/2010/main" w="9525">
+                <a14:hiddenLine xmlns:a14="http://schemas.microsoft.com/office/drawing/2010/main" xmlns="" w="9525">
                   <a:solidFill>
                     <a:srgbClr val="000000"/>
                   </a:solidFill>
@@ -4788,7 +4788,7 @@
             </a:ln>
             <a:extLst>
               <a:ext uri="{91240B29-F687-4f45-9708-019B960494DF}">
-                <a14:hiddenLine xmlns="" xmlns:a14="http://schemas.microsoft.com/office/drawing/2010/main" w="9525">
+                <a14:hiddenLine xmlns:a14="http://schemas.microsoft.com/office/drawing/2010/main" xmlns="" w="9525">
                   <a:solidFill>
                     <a:srgbClr val="000000"/>
                   </a:solidFill>
@@ -4878,7 +4878,7 @@
             </a:ln>
             <a:extLst>
               <a:ext uri="{91240B29-F687-4f45-9708-019B960494DF}">
-                <a14:hiddenLine xmlns="" xmlns:a14="http://schemas.microsoft.com/office/drawing/2010/main" w="9525">
+                <a14:hiddenLine xmlns:a14="http://schemas.microsoft.com/office/drawing/2010/main" xmlns="" w="9525">
                   <a:solidFill>
                     <a:srgbClr val="000000"/>
                   </a:solidFill>
@@ -4968,7 +4968,7 @@
             </a:ln>
             <a:extLst>
               <a:ext uri="{91240B29-F687-4f45-9708-019B960494DF}">
-                <a14:hiddenLine xmlns="" xmlns:a14="http://schemas.microsoft.com/office/drawing/2010/main" w="9525">
+                <a14:hiddenLine xmlns:a14="http://schemas.microsoft.com/office/drawing/2010/main" xmlns="" w="9525">
                   <a:solidFill>
                     <a:srgbClr val="000000"/>
                   </a:solidFill>
@@ -5030,7 +5030,7 @@
             </a:ln>
             <a:extLst>
               <a:ext uri="{91240B29-F687-4f45-9708-019B960494DF}">
-                <a14:hiddenLine xmlns="" xmlns:a14="http://schemas.microsoft.com/office/drawing/2010/main" w="9525">
+                <a14:hiddenLine xmlns:a14="http://schemas.microsoft.com/office/drawing/2010/main" xmlns="" w="9525">
                   <a:solidFill>
                     <a:srgbClr val="000000"/>
                   </a:solidFill>
@@ -5150,7 +5150,7 @@
             </a:ln>
             <a:extLst>
               <a:ext uri="{91240B29-F687-4f45-9708-019B960494DF}">
-                <a14:hiddenLine xmlns="" xmlns:a14="http://schemas.microsoft.com/office/drawing/2010/main" w="9525">
+                <a14:hiddenLine xmlns:a14="http://schemas.microsoft.com/office/drawing/2010/main" xmlns="" w="9525">
                   <a:solidFill>
                     <a:srgbClr val="000000"/>
                   </a:solidFill>
@@ -5218,7 +5218,7 @@
             </a:ln>
             <a:extLst>
               <a:ext uri="{91240B29-F687-4f45-9708-019B960494DF}">
-                <a14:hiddenLine xmlns="" xmlns:a14="http://schemas.microsoft.com/office/drawing/2010/main" w="9525">
+                <a14:hiddenLine xmlns:a14="http://schemas.microsoft.com/office/drawing/2010/main" xmlns="" w="9525">
                   <a:solidFill>
                     <a:srgbClr val="000000"/>
                   </a:solidFill>
@@ -5308,7 +5308,7 @@
             </a:ln>
             <a:extLst>
               <a:ext uri="{91240B29-F687-4f45-9708-019B960494DF}">
-                <a14:hiddenLine xmlns="" xmlns:a14="http://schemas.microsoft.com/office/drawing/2010/main" w="9525">
+                <a14:hiddenLine xmlns:a14="http://schemas.microsoft.com/office/drawing/2010/main" xmlns="" w="9525">
                   <a:solidFill>
                     <a:srgbClr val="000000"/>
                   </a:solidFill>
@@ -10064,7 +10064,7 @@
           <a:noFill/>
           <a:extLst>
             <a:ext uri="{909E8E84-426E-40dd-AFC4-6F175D3DCCD1}">
-              <a14:hiddenFill xmlns="" xmlns:a14="http://schemas.microsoft.com/office/drawing/2010/main">
+              <a14:hiddenFill xmlns:a14="http://schemas.microsoft.com/office/drawing/2010/main" xmlns="">
                 <a:solidFill>
                   <a:srgbClr val="FFFFFF"/>
                 </a:solidFill>
@@ -10138,7 +10138,7 @@
               </a:ln>
               <a:extLst>
                 <a:ext uri="{91240B29-F687-4f45-9708-019B960494DF}">
-                  <a14:hiddenLine xmlns="" xmlns:a14="http://schemas.microsoft.com/office/drawing/2010/main" w="9525">
+                  <a14:hiddenLine xmlns:a14="http://schemas.microsoft.com/office/drawing/2010/main" xmlns="" w="9525">
                     <a:solidFill>
                       <a:srgbClr val="000000"/>
                     </a:solidFill>
@@ -10228,7 +10228,7 @@
               </a:ln>
               <a:extLst>
                 <a:ext uri="{91240B29-F687-4f45-9708-019B960494DF}">
-                  <a14:hiddenLine xmlns="" xmlns:a14="http://schemas.microsoft.com/office/drawing/2010/main" w="9525">
+                  <a14:hiddenLine xmlns:a14="http://schemas.microsoft.com/office/drawing/2010/main" xmlns="" w="9525">
                     <a:solidFill>
                       <a:srgbClr val="000000"/>
                     </a:solidFill>
@@ -10318,7 +10318,7 @@
               </a:ln>
               <a:extLst>
                 <a:ext uri="{91240B29-F687-4f45-9708-019B960494DF}">
-                  <a14:hiddenLine xmlns="" xmlns:a14="http://schemas.microsoft.com/office/drawing/2010/main" w="9525">
+                  <a14:hiddenLine xmlns:a14="http://schemas.microsoft.com/office/drawing/2010/main" xmlns="" w="9525">
                     <a:solidFill>
                       <a:srgbClr val="000000"/>
                     </a:solidFill>
@@ -10380,7 +10380,7 @@
               </a:ln>
               <a:extLst>
                 <a:ext uri="{91240B29-F687-4f45-9708-019B960494DF}">
-                  <a14:hiddenLine xmlns="" xmlns:a14="http://schemas.microsoft.com/office/drawing/2010/main" w="9525">
+                  <a14:hiddenLine xmlns:a14="http://schemas.microsoft.com/office/drawing/2010/main" xmlns="" w="9525">
                     <a:solidFill>
                       <a:srgbClr val="000000"/>
                     </a:solidFill>
@@ -10470,7 +10470,7 @@
               </a:ln>
               <a:extLst>
                 <a:ext uri="{91240B29-F687-4f45-9708-019B960494DF}">
-                  <a14:hiddenLine xmlns="" xmlns:a14="http://schemas.microsoft.com/office/drawing/2010/main" w="9525">
+                  <a14:hiddenLine xmlns:a14="http://schemas.microsoft.com/office/drawing/2010/main" xmlns="" w="9525">
                     <a:solidFill>
                       <a:srgbClr val="000000"/>
                     </a:solidFill>
@@ -10532,7 +10532,7 @@
               </a:ln>
               <a:extLst>
                 <a:ext uri="{91240B29-F687-4f45-9708-019B960494DF}">
-                  <a14:hiddenLine xmlns="" xmlns:a14="http://schemas.microsoft.com/office/drawing/2010/main" w="9525">
+                  <a14:hiddenLine xmlns:a14="http://schemas.microsoft.com/office/drawing/2010/main" xmlns="" w="9525">
                     <a:solidFill>
                       <a:srgbClr val="000000"/>
                     </a:solidFill>
@@ -10594,7 +10594,7 @@
               </a:ln>
               <a:extLst>
                 <a:ext uri="{91240B29-F687-4f45-9708-019B960494DF}">
-                  <a14:hiddenLine xmlns="" xmlns:a14="http://schemas.microsoft.com/office/drawing/2010/main" w="9525">
+                  <a14:hiddenLine xmlns:a14="http://schemas.microsoft.com/office/drawing/2010/main" xmlns="" w="9525">
                     <a:solidFill>
                       <a:srgbClr val="000000"/>
                     </a:solidFill>
@@ -10684,7 +10684,7 @@
               </a:ln>
               <a:extLst>
                 <a:ext uri="{91240B29-F687-4f45-9708-019B960494DF}">
-                  <a14:hiddenLine xmlns="" xmlns:a14="http://schemas.microsoft.com/office/drawing/2010/main" w="9525">
+                  <a14:hiddenLine xmlns:a14="http://schemas.microsoft.com/office/drawing/2010/main" xmlns="" w="9525">
                     <a:solidFill>
                       <a:srgbClr val="000000"/>
                     </a:solidFill>
@@ -10774,7 +10774,7 @@
               </a:ln>
               <a:extLst>
                 <a:ext uri="{91240B29-F687-4f45-9708-019B960494DF}">
-                  <a14:hiddenLine xmlns="" xmlns:a14="http://schemas.microsoft.com/office/drawing/2010/main" w="9525">
+                  <a14:hiddenLine xmlns:a14="http://schemas.microsoft.com/office/drawing/2010/main" xmlns="" w="9525">
                     <a:solidFill>
                       <a:srgbClr val="000000"/>
                     </a:solidFill>
@@ -10836,7 +10836,7 @@
               </a:ln>
               <a:extLst>
                 <a:ext uri="{91240B29-F687-4f45-9708-019B960494DF}">
-                  <a14:hiddenLine xmlns="" xmlns:a14="http://schemas.microsoft.com/office/drawing/2010/main" w="9525">
+                  <a14:hiddenLine xmlns:a14="http://schemas.microsoft.com/office/drawing/2010/main" xmlns="" w="9525">
                     <a:solidFill>
                       <a:srgbClr val="000000"/>
                     </a:solidFill>
@@ -10946,7 +10946,7 @@
               </a:ln>
               <a:extLst>
                 <a:ext uri="{91240B29-F687-4f45-9708-019B960494DF}">
-                  <a14:hiddenLine xmlns="" xmlns:a14="http://schemas.microsoft.com/office/drawing/2010/main" w="9525">
+                  <a14:hiddenLine xmlns:a14="http://schemas.microsoft.com/office/drawing/2010/main" xmlns="" w="9525">
                     <a:solidFill>
                       <a:srgbClr val="000000"/>
                     </a:solidFill>
@@ -11030,7 +11030,7 @@
               </a:ln>
               <a:extLst>
                 <a:ext uri="{91240B29-F687-4f45-9708-019B960494DF}">
-                  <a14:hiddenLine xmlns="" xmlns:a14="http://schemas.microsoft.com/office/drawing/2010/main" w="9525">
+                  <a14:hiddenLine xmlns:a14="http://schemas.microsoft.com/office/drawing/2010/main" xmlns="" w="9525">
                     <a:solidFill>
                       <a:srgbClr val="000000"/>
                     </a:solidFill>
@@ -11092,7 +11092,7 @@
               </a:ln>
               <a:extLst>
                 <a:ext uri="{91240B29-F687-4f45-9708-019B960494DF}">
-                  <a14:hiddenLine xmlns="" xmlns:a14="http://schemas.microsoft.com/office/drawing/2010/main" w="9525">
+                  <a14:hiddenLine xmlns:a14="http://schemas.microsoft.com/office/drawing/2010/main" xmlns="" w="9525">
                     <a:solidFill>
                       <a:srgbClr val="000000"/>
                     </a:solidFill>
@@ -11154,7 +11154,7 @@
               </a:ln>
               <a:extLst>
                 <a:ext uri="{91240B29-F687-4f45-9708-019B960494DF}">
-                  <a14:hiddenLine xmlns="" xmlns:a14="http://schemas.microsoft.com/office/drawing/2010/main" w="9525">
+                  <a14:hiddenLine xmlns:a14="http://schemas.microsoft.com/office/drawing/2010/main" xmlns="" w="9525">
                     <a:solidFill>
                       <a:srgbClr val="000000"/>
                     </a:solidFill>
@@ -11244,7 +11244,7 @@
               </a:ln>
               <a:extLst>
                 <a:ext uri="{91240B29-F687-4f45-9708-019B960494DF}">
-                  <a14:hiddenLine xmlns="" xmlns:a14="http://schemas.microsoft.com/office/drawing/2010/main" w="9525">
+                  <a14:hiddenLine xmlns:a14="http://schemas.microsoft.com/office/drawing/2010/main" xmlns="" w="9525">
                     <a:solidFill>
                       <a:srgbClr val="000000"/>
                     </a:solidFill>
@@ -11278,7 +11278,7 @@
               </a:ln>
               <a:extLst>
                 <a:ext uri="{91240B29-F687-4f45-9708-019B960494DF}">
-                  <a14:hiddenLine xmlns="" xmlns:a14="http://schemas.microsoft.com/office/drawing/2010/main" w="9525">
+                  <a14:hiddenLine xmlns:a14="http://schemas.microsoft.com/office/drawing/2010/main" xmlns="" w="9525">
                     <a:solidFill>
                       <a:srgbClr val="000000"/>
                     </a:solidFill>
@@ -11343,7 +11343,7 @@
               </a:ln>
               <a:extLst>
                 <a:ext uri="{91240B29-F687-4f45-9708-019B960494DF}">
-                  <a14:hiddenLine xmlns="" xmlns:a14="http://schemas.microsoft.com/office/drawing/2010/main" w="9525">
+                  <a14:hiddenLine xmlns:a14="http://schemas.microsoft.com/office/drawing/2010/main" xmlns="" w="9525">
                     <a:solidFill>
                       <a:srgbClr val="000000"/>
                     </a:solidFill>
@@ -11433,7 +11433,7 @@
               </a:ln>
               <a:extLst>
                 <a:ext uri="{91240B29-F687-4f45-9708-019B960494DF}">
-                  <a14:hiddenLine xmlns="" xmlns:a14="http://schemas.microsoft.com/office/drawing/2010/main" w="9525">
+                  <a14:hiddenLine xmlns:a14="http://schemas.microsoft.com/office/drawing/2010/main" xmlns="" w="9525">
                     <a:solidFill>
                       <a:srgbClr val="000000"/>
                     </a:solidFill>
@@ -11495,7 +11495,7 @@
               </a:ln>
               <a:extLst>
                 <a:ext uri="{91240B29-F687-4f45-9708-019B960494DF}">
-                  <a14:hiddenLine xmlns="" xmlns:a14="http://schemas.microsoft.com/office/drawing/2010/main" w="9525">
+                  <a14:hiddenLine xmlns:a14="http://schemas.microsoft.com/office/drawing/2010/main" xmlns="" w="9525">
                     <a:solidFill>
                       <a:srgbClr val="000000"/>
                     </a:solidFill>
@@ -11585,7 +11585,7 @@
               </a:ln>
               <a:extLst>
                 <a:ext uri="{91240B29-F687-4f45-9708-019B960494DF}">
-                  <a14:hiddenLine xmlns="" xmlns:a14="http://schemas.microsoft.com/office/drawing/2010/main" w="9525">
+                  <a14:hiddenLine xmlns:a14="http://schemas.microsoft.com/office/drawing/2010/main" xmlns="" w="9525">
                     <a:solidFill>
                       <a:srgbClr val="000000"/>
                     </a:solidFill>
@@ -11650,7 +11650,7 @@
               </a:ln>
               <a:extLst>
                 <a:ext uri="{91240B29-F687-4f45-9708-019B960494DF}">
-                  <a14:hiddenLine xmlns="" xmlns:a14="http://schemas.microsoft.com/office/drawing/2010/main" w="9525">
+                  <a14:hiddenLine xmlns:a14="http://schemas.microsoft.com/office/drawing/2010/main" xmlns="" w="9525">
                     <a:solidFill>
                       <a:srgbClr val="000000"/>
                     </a:solidFill>
@@ -11712,7 +11712,7 @@
               </a:ln>
               <a:extLst>
                 <a:ext uri="{91240B29-F687-4f45-9708-019B960494DF}">
-                  <a14:hiddenLine xmlns="" xmlns:a14="http://schemas.microsoft.com/office/drawing/2010/main" w="9525">
+                  <a14:hiddenLine xmlns:a14="http://schemas.microsoft.com/office/drawing/2010/main" xmlns="" w="9525">
                     <a:solidFill>
                       <a:srgbClr val="000000"/>
                     </a:solidFill>
@@ -11802,7 +11802,7 @@
               </a:ln>
               <a:extLst>
                 <a:ext uri="{91240B29-F687-4f45-9708-019B960494DF}">
-                  <a14:hiddenLine xmlns="" xmlns:a14="http://schemas.microsoft.com/office/drawing/2010/main" w="9525">
+                  <a14:hiddenLine xmlns:a14="http://schemas.microsoft.com/office/drawing/2010/main" xmlns="" w="9525">
                     <a:solidFill>
                       <a:srgbClr val="000000"/>
                     </a:solidFill>
@@ -11892,7 +11892,7 @@
               </a:ln>
               <a:extLst>
                 <a:ext uri="{91240B29-F687-4f45-9708-019B960494DF}">
-                  <a14:hiddenLine xmlns="" xmlns:a14="http://schemas.microsoft.com/office/drawing/2010/main" w="9525">
+                  <a14:hiddenLine xmlns:a14="http://schemas.microsoft.com/office/drawing/2010/main" xmlns="" w="9525">
                     <a:solidFill>
                       <a:srgbClr val="000000"/>
                     </a:solidFill>
@@ -11957,7 +11957,7 @@
               </a:ln>
               <a:extLst>
                 <a:ext uri="{91240B29-F687-4f45-9708-019B960494DF}">
-                  <a14:hiddenLine xmlns="" xmlns:a14="http://schemas.microsoft.com/office/drawing/2010/main" w="9525">
+                  <a14:hiddenLine xmlns:a14="http://schemas.microsoft.com/office/drawing/2010/main" xmlns="" w="9525">
                     <a:solidFill>
                       <a:srgbClr val="000000"/>
                     </a:solidFill>
@@ -12077,7 +12077,7 @@
               </a:ln>
               <a:extLst>
                 <a:ext uri="{91240B29-F687-4f45-9708-019B960494DF}">
-                  <a14:hiddenLine xmlns="" xmlns:a14="http://schemas.microsoft.com/office/drawing/2010/main" w="9525">
+                  <a14:hiddenLine xmlns:a14="http://schemas.microsoft.com/office/drawing/2010/main" xmlns="" w="9525">
                     <a:solidFill>
                       <a:srgbClr val="000000"/>
                     </a:solidFill>
@@ -12175,7 +12175,7 @@
               </a:ln>
               <a:extLst>
                 <a:ext uri="{91240B29-F687-4f45-9708-019B960494DF}">
-                  <a14:hiddenLine xmlns="" xmlns:a14="http://schemas.microsoft.com/office/drawing/2010/main" w="9525">
+                  <a14:hiddenLine xmlns:a14="http://schemas.microsoft.com/office/drawing/2010/main" xmlns="" w="9525">
                     <a:solidFill>
                       <a:srgbClr val="000000"/>
                     </a:solidFill>
@@ -12290,7 +12290,7 @@
               </a:ln>
               <a:extLst>
                 <a:ext uri="{91240B29-F687-4f45-9708-019B960494DF}">
-                  <a14:hiddenLine xmlns="" xmlns:a14="http://schemas.microsoft.com/office/drawing/2010/main" w="9525">
+                  <a14:hiddenLine xmlns:a14="http://schemas.microsoft.com/office/drawing/2010/main" xmlns="" w="9525">
                     <a:solidFill>
                       <a:srgbClr val="000000"/>
                     </a:solidFill>
@@ -12380,7 +12380,7 @@
               </a:ln>
               <a:extLst>
                 <a:ext uri="{91240B29-F687-4f45-9708-019B960494DF}">
-                  <a14:hiddenLine xmlns="" xmlns:a14="http://schemas.microsoft.com/office/drawing/2010/main" w="9525">
+                  <a14:hiddenLine xmlns:a14="http://schemas.microsoft.com/office/drawing/2010/main" xmlns="" w="9525">
                     <a:solidFill>
                       <a:srgbClr val="000000"/>
                     </a:solidFill>
@@ -12445,7 +12445,7 @@
               </a:ln>
               <a:extLst>
                 <a:ext uri="{91240B29-F687-4f45-9708-019B960494DF}">
-                  <a14:hiddenLine xmlns="" xmlns:a14="http://schemas.microsoft.com/office/drawing/2010/main" w="9525">
+                  <a14:hiddenLine xmlns:a14="http://schemas.microsoft.com/office/drawing/2010/main" xmlns="" w="9525">
                     <a:solidFill>
                       <a:srgbClr val="000000"/>
                     </a:solidFill>
@@ -12535,7 +12535,7 @@
               </a:ln>
               <a:extLst>
                 <a:ext uri="{91240B29-F687-4f45-9708-019B960494DF}">
-                  <a14:hiddenLine xmlns="" xmlns:a14="http://schemas.microsoft.com/office/drawing/2010/main" w="9525">
+                  <a14:hiddenLine xmlns:a14="http://schemas.microsoft.com/office/drawing/2010/main" xmlns="" w="9525">
                     <a:solidFill>
                       <a:srgbClr val="000000"/>
                     </a:solidFill>
@@ -12603,7 +12603,7 @@
               </a:ln>
               <a:extLst>
                 <a:ext uri="{91240B29-F687-4f45-9708-019B960494DF}">
-                  <a14:hiddenLine xmlns="" xmlns:a14="http://schemas.microsoft.com/office/drawing/2010/main" w="9525">
+                  <a14:hiddenLine xmlns:a14="http://schemas.microsoft.com/office/drawing/2010/main" xmlns="" w="9525">
                     <a:solidFill>
                       <a:srgbClr val="000000"/>
                     </a:solidFill>
@@ -12693,7 +12693,7 @@
               </a:ln>
               <a:extLst>
                 <a:ext uri="{91240B29-F687-4f45-9708-019B960494DF}">
-                  <a14:hiddenLine xmlns="" xmlns:a14="http://schemas.microsoft.com/office/drawing/2010/main" w="9525">
+                  <a14:hiddenLine xmlns:a14="http://schemas.microsoft.com/office/drawing/2010/main" xmlns="" w="9525">
                     <a:solidFill>
                       <a:srgbClr val="000000"/>
                     </a:solidFill>
@@ -12761,7 +12761,7 @@
               </a:ln>
               <a:extLst>
                 <a:ext uri="{91240B29-F687-4f45-9708-019B960494DF}">
-                  <a14:hiddenLine xmlns="" xmlns:a14="http://schemas.microsoft.com/office/drawing/2010/main" w="9525">
+                  <a14:hiddenLine xmlns:a14="http://schemas.microsoft.com/office/drawing/2010/main" xmlns="" w="9525">
                     <a:solidFill>
                       <a:srgbClr val="000000"/>
                     </a:solidFill>
@@ -12851,7 +12851,7 @@
               </a:ln>
               <a:extLst>
                 <a:ext uri="{91240B29-F687-4f45-9708-019B960494DF}">
-                  <a14:hiddenLine xmlns="" xmlns:a14="http://schemas.microsoft.com/office/drawing/2010/main" w="9525">
+                  <a14:hiddenLine xmlns:a14="http://schemas.microsoft.com/office/drawing/2010/main" xmlns="" w="9525">
                     <a:solidFill>
                       <a:srgbClr val="000000"/>
                     </a:solidFill>
@@ -12885,7 +12885,7 @@
               </a:ln>
               <a:extLst>
                 <a:ext uri="{91240B29-F687-4f45-9708-019B960494DF}">
-                  <a14:hiddenLine xmlns="" xmlns:a14="http://schemas.microsoft.com/office/drawing/2010/main" w="9525">
+                  <a14:hiddenLine xmlns:a14="http://schemas.microsoft.com/office/drawing/2010/main" xmlns="" w="9525">
                     <a:solidFill>
                       <a:srgbClr val="000000"/>
                     </a:solidFill>
@@ -32372,7 +32372,15 @@
           <a:p>
             <a:r>
               <a:rPr lang="en-US" dirty="0"/>
-              <a:t>Tomorrow we will be looking at mutual exclusion constructs and how we can control order of execution for threaded programs</a:t>
+              <a:t>Tomorrow we will take a more in-depth look at how we can use multiple threads </a:t>
+            </a:r>
+            <a:r>
+              <a:rPr lang="en-US"/>
+              <a:t>to parallelize </a:t>
+            </a:r>
+            <a:r>
+              <a:rPr lang="en-US" dirty="0"/>
+              <a:t>a sequential program</a:t>
             </a:r>
           </a:p>
         </p:txBody>

</xml_diff>